<commit_message>
Add Git how to
</commit_message>
<xml_diff>
--- a/presentations/Fundamental Big Data Analysis & Science - Git.pptx
+++ b/presentations/Fundamental Big Data Analysis & Science - Git.pptx
@@ -6,9 +6,9 @@
   </p:sldMasterIdLst>
   <p:sldIdLst>
     <p:sldId id="256" r:id="rId2"/>
-    <p:sldId id="259" r:id="rId3"/>
+    <p:sldId id="258" r:id="rId3"/>
     <p:sldId id="257" r:id="rId4"/>
-    <p:sldId id="258" r:id="rId5"/>
+    <p:sldId id="259" r:id="rId5"/>
     <p:sldId id="260" r:id="rId6"/>
   </p:sldIdLst>
   <p:sldSz cx="12192000" cy="6858000"/>
@@ -108,6 +108,11 @@
       </a:defRPr>
     </a:lvl9pPr>
   </p:defaultTextStyle>
+  <p:extLst>
+    <p:ext uri="{EFAFB233-063F-42B5-8137-9DF3F51BA10A}">
+      <p15:sldGuideLst xmlns:p15="http://schemas.microsoft.com/office/powerpoint/2012/main"/>
+    </p:ext>
+  </p:extLst>
 </p:presentation>
 </file>
 
@@ -860,7 +865,7 @@
           <a:p>
             <a:fld id="{82DE8050-FCF9-4E38-97D9-2A7F4AE2DC1A}" type="datetimeFigureOut">
               <a:rPr lang="nl-NL" smtClean="0"/>
-              <a:t>29-7-2018</a:t>
+              <a:t>30-7-2018</a:t>
             </a:fld>
             <a:endParaRPr lang="nl-NL"/>
           </a:p>
@@ -1111,7 +1116,7 @@
           <a:p>
             <a:fld id="{82DE8050-FCF9-4E38-97D9-2A7F4AE2DC1A}" type="datetimeFigureOut">
               <a:rPr lang="nl-NL" smtClean="0"/>
-              <a:t>29-7-2018</a:t>
+              <a:t>30-7-2018</a:t>
             </a:fld>
             <a:endParaRPr lang="nl-NL"/>
           </a:p>
@@ -1425,7 +1430,7 @@
           <a:p>
             <a:fld id="{82DE8050-FCF9-4E38-97D9-2A7F4AE2DC1A}" type="datetimeFigureOut">
               <a:rPr lang="nl-NL" smtClean="0"/>
-              <a:t>29-7-2018</a:t>
+              <a:t>30-7-2018</a:t>
             </a:fld>
             <a:endParaRPr lang="nl-NL"/>
           </a:p>
@@ -1758,7 +1763,7 @@
           <a:p>
             <a:fld id="{82DE8050-FCF9-4E38-97D9-2A7F4AE2DC1A}" type="datetimeFigureOut">
               <a:rPr lang="nl-NL" smtClean="0"/>
-              <a:t>29-7-2018</a:t>
+              <a:t>30-7-2018</a:t>
             </a:fld>
             <a:endParaRPr lang="nl-NL"/>
           </a:p>
@@ -2072,7 +2077,7 @@
           <a:p>
             <a:fld id="{82DE8050-FCF9-4E38-97D9-2A7F4AE2DC1A}" type="datetimeFigureOut">
               <a:rPr lang="nl-NL" smtClean="0"/>
-              <a:t>29-7-2018</a:t>
+              <a:t>30-7-2018</a:t>
             </a:fld>
             <a:endParaRPr lang="nl-NL"/>
           </a:p>
@@ -2465,7 +2470,7 @@
           <a:p>
             <a:fld id="{82DE8050-FCF9-4E38-97D9-2A7F4AE2DC1A}" type="datetimeFigureOut">
               <a:rPr lang="nl-NL" smtClean="0"/>
-              <a:t>29-7-2018</a:t>
+              <a:t>30-7-2018</a:t>
             </a:fld>
             <a:endParaRPr lang="nl-NL"/>
           </a:p>
@@ -2635,7 +2640,7 @@
           <a:p>
             <a:fld id="{82DE8050-FCF9-4E38-97D9-2A7F4AE2DC1A}" type="datetimeFigureOut">
               <a:rPr lang="nl-NL" smtClean="0"/>
-              <a:t>29-7-2018</a:t>
+              <a:t>30-7-2018</a:t>
             </a:fld>
             <a:endParaRPr lang="nl-NL"/>
           </a:p>
@@ -2815,7 +2820,7 @@
           <a:p>
             <a:fld id="{82DE8050-FCF9-4E38-97D9-2A7F4AE2DC1A}" type="datetimeFigureOut">
               <a:rPr lang="nl-NL" smtClean="0"/>
-              <a:t>29-7-2018</a:t>
+              <a:t>30-7-2018</a:t>
             </a:fld>
             <a:endParaRPr lang="nl-NL"/>
           </a:p>
@@ -2985,7 +2990,7 @@
           <a:p>
             <a:fld id="{82DE8050-FCF9-4E38-97D9-2A7F4AE2DC1A}" type="datetimeFigureOut">
               <a:rPr lang="nl-NL" smtClean="0"/>
-              <a:t>29-7-2018</a:t>
+              <a:t>30-7-2018</a:t>
             </a:fld>
             <a:endParaRPr lang="nl-NL"/>
           </a:p>
@@ -3232,7 +3237,7 @@
           <a:p>
             <a:fld id="{82DE8050-FCF9-4E38-97D9-2A7F4AE2DC1A}" type="datetimeFigureOut">
               <a:rPr lang="nl-NL" smtClean="0"/>
-              <a:t>29-7-2018</a:t>
+              <a:t>30-7-2018</a:t>
             </a:fld>
             <a:endParaRPr lang="nl-NL"/>
           </a:p>
@@ -3464,7 +3469,7 @@
           <a:p>
             <a:fld id="{82DE8050-FCF9-4E38-97D9-2A7F4AE2DC1A}" type="datetimeFigureOut">
               <a:rPr lang="nl-NL" smtClean="0"/>
-              <a:t>29-7-2018</a:t>
+              <a:t>30-7-2018</a:t>
             </a:fld>
             <a:endParaRPr lang="nl-NL"/>
           </a:p>
@@ -3838,7 +3843,7 @@
           <a:p>
             <a:fld id="{82DE8050-FCF9-4E38-97D9-2A7F4AE2DC1A}" type="datetimeFigureOut">
               <a:rPr lang="nl-NL" smtClean="0"/>
-              <a:t>29-7-2018</a:t>
+              <a:t>30-7-2018</a:t>
             </a:fld>
             <a:endParaRPr lang="nl-NL"/>
           </a:p>
@@ -3961,7 +3966,7 @@
           <a:p>
             <a:fld id="{82DE8050-FCF9-4E38-97D9-2A7F4AE2DC1A}" type="datetimeFigureOut">
               <a:rPr lang="nl-NL" smtClean="0"/>
-              <a:t>29-7-2018</a:t>
+              <a:t>30-7-2018</a:t>
             </a:fld>
             <a:endParaRPr lang="nl-NL"/>
           </a:p>
@@ -4056,7 +4061,7 @@
           <a:p>
             <a:fld id="{82DE8050-FCF9-4E38-97D9-2A7F4AE2DC1A}" type="datetimeFigureOut">
               <a:rPr lang="nl-NL" smtClean="0"/>
-              <a:t>29-7-2018</a:t>
+              <a:t>30-7-2018</a:t>
             </a:fld>
             <a:endParaRPr lang="nl-NL"/>
           </a:p>
@@ -4311,7 +4316,7 @@
           <a:p>
             <a:fld id="{82DE8050-FCF9-4E38-97D9-2A7F4AE2DC1A}" type="datetimeFigureOut">
               <a:rPr lang="nl-NL" smtClean="0"/>
-              <a:t>29-7-2018</a:t>
+              <a:t>30-7-2018</a:t>
             </a:fld>
             <a:endParaRPr lang="nl-NL"/>
           </a:p>
@@ -4616,7 +4621,7 @@
           <a:p>
             <a:fld id="{82DE8050-FCF9-4E38-97D9-2A7F4AE2DC1A}" type="datetimeFigureOut">
               <a:rPr lang="nl-NL" smtClean="0"/>
-              <a:t>29-7-2018</a:t>
+              <a:t>30-7-2018</a:t>
             </a:fld>
             <a:endParaRPr lang="nl-NL"/>
           </a:p>
@@ -5318,7 +5323,7 @@
           <a:p>
             <a:fld id="{82DE8050-FCF9-4E38-97D9-2A7F4AE2DC1A}" type="datetimeFigureOut">
               <a:rPr lang="nl-NL" smtClean="0"/>
-              <a:t>29-7-2018</a:t>
+              <a:t>30-7-2018</a:t>
             </a:fld>
             <a:endParaRPr lang="nl-NL"/>
           </a:p>
@@ -5978,7 +5983,7 @@
           <p:cNvPr id="2" name="Title 1">
             <a:extLst>
               <a:ext uri="{FF2B5EF4-FFF2-40B4-BE49-F238E27FC236}">
-                <a16:creationId xmlns:a16="http://schemas.microsoft.com/office/drawing/2014/main" id="{1D85821D-5EA9-4794-8577-565DD52A1124}"/>
+                <a16:creationId xmlns:a16="http://schemas.microsoft.com/office/drawing/2014/main" id="{850E0DEB-DFC4-41D6-B58F-1517370483B8}"/>
               </a:ext>
             </a:extLst>
           </p:cNvPr>
@@ -5996,7 +6001,7 @@
           <a:p>
             <a:r>
               <a:rPr lang="en-US" dirty="0"/>
-              <a:t>What is Git</a:t>
+              <a:t>Why use Git?</a:t>
             </a:r>
             <a:endParaRPr lang="nl-NL" dirty="0"/>
           </a:p>
@@ -6004,19 +6009,17 @@
       </p:sp>
       <p:pic>
         <p:nvPicPr>
-          <p:cNvPr id="3074" name="Picture 2" descr="https://mtyurt.net/img/git_2x.png">
+          <p:cNvPr id="4098" name="Picture 2" descr="http://smutch.github.io/VersionControlTutorial/_images/vc-xkcd.jpg">
             <a:extLst>
               <a:ext uri="{FF2B5EF4-FFF2-40B4-BE49-F238E27FC236}">
-                <a16:creationId xmlns:a16="http://schemas.microsoft.com/office/drawing/2014/main" id="{7B5F1ABE-73E9-4F3A-B1DE-85F122ABE5C4}"/>
+                <a16:creationId xmlns:a16="http://schemas.microsoft.com/office/drawing/2014/main" id="{13E3F488-3B73-4C7A-A8AA-05021ED3AF0F}"/>
               </a:ext>
             </a:extLst>
           </p:cNvPr>
           <p:cNvPicPr>
-            <a:picLocks noGrp="1" noChangeAspect="1" noChangeArrowheads="1"/>
+            <a:picLocks noChangeAspect="1" noChangeArrowheads="1"/>
           </p:cNvPicPr>
-          <p:nvPr>
-            <p:ph idx="1"/>
-          </p:nvPr>
+          <p:nvPr/>
         </p:nvPicPr>
         <p:blipFill>
           <a:blip r:embed="rId2">
@@ -6033,8 +6036,8 @@
         </p:blipFill>
         <p:spPr bwMode="auto">
           <a:xfrm>
-            <a:off x="4043737" y="609600"/>
-            <a:ext cx="3785813" cy="5475397"/>
+            <a:off x="338448" y="1930400"/>
+            <a:ext cx="9274439" cy="4262438"/>
           </a:xfrm>
           <a:prstGeom prst="rect">
             <a:avLst/>
@@ -6054,7 +6057,7 @@
     </p:spTree>
     <p:extLst>
       <p:ext uri="{BB962C8B-B14F-4D97-AF65-F5344CB8AC3E}">
-        <p14:creationId xmlns:p14="http://schemas.microsoft.com/office/powerpoint/2010/main" val="2132973185"/>
+        <p14:creationId xmlns:p14="http://schemas.microsoft.com/office/powerpoint/2010/main" val="755953845"/>
       </p:ext>
     </p:extLst>
   </p:cSld>
@@ -6163,7 +6166,7 @@
           <p:cNvPr id="2" name="Title 1">
             <a:extLst>
               <a:ext uri="{FF2B5EF4-FFF2-40B4-BE49-F238E27FC236}">
-                <a16:creationId xmlns:a16="http://schemas.microsoft.com/office/drawing/2014/main" id="{850E0DEB-DFC4-41D6-B58F-1517370483B8}"/>
+                <a16:creationId xmlns:a16="http://schemas.microsoft.com/office/drawing/2014/main" id="{1D85821D-5EA9-4794-8577-565DD52A1124}"/>
               </a:ext>
             </a:extLst>
           </p:cNvPr>
@@ -6181,7 +6184,7 @@
           <a:p>
             <a:r>
               <a:rPr lang="en-US" dirty="0"/>
-              <a:t>Why use Git?</a:t>
+              <a:t>What is Git</a:t>
             </a:r>
             <a:endParaRPr lang="nl-NL" dirty="0"/>
           </a:p>
@@ -6189,17 +6192,19 @@
       </p:sp>
       <p:pic>
         <p:nvPicPr>
-          <p:cNvPr id="4098" name="Picture 2" descr="http://smutch.github.io/VersionControlTutorial/_images/vc-xkcd.jpg">
+          <p:cNvPr id="3074" name="Picture 2" descr="https://mtyurt.net/img/git_2x.png">
             <a:extLst>
               <a:ext uri="{FF2B5EF4-FFF2-40B4-BE49-F238E27FC236}">
-                <a16:creationId xmlns:a16="http://schemas.microsoft.com/office/drawing/2014/main" id="{13E3F488-3B73-4C7A-A8AA-05021ED3AF0F}"/>
+                <a16:creationId xmlns:a16="http://schemas.microsoft.com/office/drawing/2014/main" id="{7B5F1ABE-73E9-4F3A-B1DE-85F122ABE5C4}"/>
               </a:ext>
             </a:extLst>
           </p:cNvPr>
           <p:cNvPicPr>
-            <a:picLocks noChangeAspect="1" noChangeArrowheads="1"/>
+            <a:picLocks noGrp="1" noChangeAspect="1" noChangeArrowheads="1"/>
           </p:cNvPicPr>
-          <p:nvPr/>
+          <p:nvPr>
+            <p:ph idx="1"/>
+          </p:nvPr>
         </p:nvPicPr>
         <p:blipFill>
           <a:blip r:embed="rId2">
@@ -6216,8 +6221,8 @@
         </p:blipFill>
         <p:spPr bwMode="auto">
           <a:xfrm>
-            <a:off x="338448" y="1930400"/>
-            <a:ext cx="9274439" cy="4262438"/>
+            <a:off x="4043737" y="609600"/>
+            <a:ext cx="3785813" cy="5475397"/>
           </a:xfrm>
           <a:prstGeom prst="rect">
             <a:avLst/>
@@ -6237,7 +6242,7 @@
     </p:spTree>
     <p:extLst>
       <p:ext uri="{BB962C8B-B14F-4D97-AF65-F5344CB8AC3E}">
-        <p14:creationId xmlns:p14="http://schemas.microsoft.com/office/powerpoint/2010/main" val="755953845"/>
+        <p14:creationId xmlns:p14="http://schemas.microsoft.com/office/powerpoint/2010/main" val="2132973185"/>
       </p:ext>
     </p:extLst>
   </p:cSld>

</xml_diff>